<commit_message>
Typos from teaching the class.
</commit_message>
<xml_diff>
--- a/node/lesson-50-working-with-the-file-system/working-with-the-file-system.pptx
+++ b/node/lesson-50-working-with-the-file-system/working-with-the-file-system.pptx
@@ -3040,15 +3040,7 @@
           <a:p>
             <a:r>
               <a:rPr lang="en-US" dirty="0" smtClean="0"/>
-              <a:t>Reading a File</a:t>
-            </a:r>
-            <a:r>
-              <a:rPr lang="en-US" dirty="0" smtClean="0"/>
-              <a:t>: </a:t>
-            </a:r>
-            <a:r>
-              <a:rPr lang="en-US" dirty="0" smtClean="0"/>
-              <a:t>Another Example</a:t>
+              <a:t>Reading a File: Another Example</a:t>
             </a:r>
             <a:endParaRPr lang="en-US" dirty="0"/>
           </a:p>
@@ -3658,11 +3650,7 @@
           <a:p>
             <a:r>
               <a:rPr lang="en-US" dirty="0" smtClean="0"/>
-              <a:t>Writing to a File: </a:t>
-            </a:r>
-            <a:r>
-              <a:rPr lang="en-US" dirty="0" smtClean="0"/>
-              <a:t>Example</a:t>
+              <a:t>Writing to a File: Example</a:t>
             </a:r>
             <a:endParaRPr lang="en-US" dirty="0"/>
           </a:p>
@@ -4940,6 +4928,9 @@
             </a:r>
             <a:r>
               <a:rPr lang="en-US" sz="1800" dirty="0" err="1" smtClean="0">
+                <a:solidFill>
+                  <a:srgbClr val="FF0000"/>
+                </a:solidFill>
                 <a:latin typeface="Monaco"/>
                 <a:cs typeface="Monaco"/>
               </a:rPr>
@@ -4978,12 +4969,18 @@
             </a:r>
             <a:r>
               <a:rPr lang="en-US" sz="1800" dirty="0" err="1" smtClean="0">
+                <a:solidFill>
+                  <a:srgbClr val="FF0000"/>
+                </a:solidFill>
                 <a:latin typeface="Monaco"/>
                 <a:cs typeface="Monaco"/>
               </a:rPr>
               <a:t>fs.stat</a:t>
             </a:r>
             <a:endParaRPr lang="en-US" sz="1800" dirty="0">
+              <a:solidFill>
+                <a:srgbClr val="FF0000"/>
+              </a:solidFill>
               <a:latin typeface="Monaco"/>
               <a:cs typeface="Monaco"/>
             </a:endParaRPr>
@@ -4996,12 +4993,18 @@
             </a:r>
             <a:r>
               <a:rPr lang="en-US" sz="1800" dirty="0" err="1" smtClean="0">
+                <a:solidFill>
+                  <a:srgbClr val="FF0000"/>
+                </a:solidFill>
                 <a:latin typeface="Monaco"/>
                 <a:cs typeface="Monaco"/>
               </a:rPr>
               <a:t>fs.watch</a:t>
             </a:r>
             <a:endParaRPr lang="en-US" sz="1800" dirty="0" smtClean="0">
+              <a:solidFill>
+                <a:srgbClr val="FF0000"/>
+              </a:solidFill>
               <a:latin typeface="Monaco"/>
               <a:cs typeface="Monaco"/>
             </a:endParaRPr>
@@ -5022,6 +5025,9 @@
             </a:r>
             <a:r>
               <a:rPr lang="en-US" sz="1800" dirty="0" err="1" smtClean="0">
+                <a:solidFill>
+                  <a:srgbClr val="FF0000"/>
+                </a:solidFill>
                 <a:latin typeface="Monaco"/>
                 <a:cs typeface="Monaco"/>
               </a:rPr>
@@ -5033,6 +5039,9 @@
             </a:r>
             <a:r>
               <a:rPr lang="en-US" sz="1800" dirty="0" err="1" smtClean="0">
+                <a:solidFill>
+                  <a:srgbClr val="FF0000"/>
+                </a:solidFill>
                 <a:latin typeface="Monaco"/>
                 <a:cs typeface="Monaco"/>
               </a:rPr>
@@ -5198,6 +5207,9 @@
             </a:r>
             <a:r>
               <a:rPr lang="en-US" sz="2000" dirty="0" err="1" smtClean="0">
+                <a:solidFill>
+                  <a:srgbClr val="FF0000"/>
+                </a:solidFill>
                 <a:latin typeface="Monaco"/>
                 <a:cs typeface="Monaco"/>
               </a:rPr>
@@ -5205,13 +5217,26 @@
             </a:r>
             <a:r>
               <a:rPr lang="en-US" sz="2000" dirty="0" smtClean="0">
-                <a:latin typeface="Monaco"/>
-                <a:cs typeface="Monaco"/>
-              </a:rPr>
-              <a:t> = require('</a:t>
+                <a:solidFill>
+                  <a:srgbClr val="FF0000"/>
+                </a:solidFill>
+                <a:latin typeface="Monaco"/>
+                <a:cs typeface="Monaco"/>
+              </a:rPr>
+              <a:t> </a:t>
+            </a:r>
+            <a:r>
+              <a:rPr lang="en-US" sz="2000" dirty="0" smtClean="0">
+                <a:latin typeface="Monaco"/>
+                <a:cs typeface="Monaco"/>
+              </a:rPr>
+              <a:t>= require('</a:t>
             </a:r>
             <a:r>
               <a:rPr lang="en-US" sz="2000" dirty="0" err="1" smtClean="0">
+                <a:solidFill>
+                  <a:srgbClr val="FF0000"/>
+                </a:solidFill>
                 <a:latin typeface="Monaco"/>
                 <a:cs typeface="Monaco"/>
               </a:rPr>
@@ -5225,18 +5250,11 @@
               <a:t>'</a:t>
             </a:r>
             <a:r>
-              <a:rPr lang="en-US" sz="2000" smtClean="0">
-                <a:latin typeface="Monaco"/>
-                <a:cs typeface="Monaco"/>
-              </a:rPr>
-              <a:t>)</a:t>
-            </a:r>
-            <a:r>
               <a:rPr lang="en-US" sz="2000" dirty="0" smtClean="0">
                 <a:latin typeface="Monaco"/>
                 <a:cs typeface="Monaco"/>
               </a:rPr>
-              <a:t>;</a:t>
+              <a:t>);</a:t>
             </a:r>
           </a:p>
           <a:p>
@@ -5797,6 +5815,9 @@
             </a:r>
             <a:r>
               <a:rPr lang="en-US" sz="1800" dirty="0" err="1" smtClean="0">
+                <a:solidFill>
+                  <a:srgbClr val="FF0000"/>
+                </a:solidFill>
                 <a:latin typeface="Monaco"/>
                 <a:cs typeface="Monaco"/>
               </a:rPr>
@@ -6462,18 +6483,7 @@
                 </a:solidFill>
                 <a:latin typeface="Calibri" pitchFamily="34" charset="0"/>
               </a:rPr>
-              <a:t>Callback function receives </a:t>
-            </a:r>
-            <a:r>
-              <a:rPr lang="en-US" sz="2000" i="1" dirty="0" smtClean="0">
-                <a:solidFill>
-                  <a:schemeClr val="tx2">
-                    <a:lumMod val="75000"/>
-                  </a:schemeClr>
-                </a:solidFill>
-                <a:latin typeface="Calibri" pitchFamily="34" charset="0"/>
-              </a:rPr>
-              <a:t>results</a:t>
+              <a:t>Callback function receives results</a:t>
             </a:r>
             <a:endParaRPr kumimoji="0" lang="en-US" sz="2000" i="1" u="none" strike="noStrike" cap="none" normalizeH="0" baseline="0" dirty="0" smtClean="0">
               <a:ln>
@@ -6708,10 +6718,18 @@
               <a:t>Function returns an </a:t>
             </a:r>
             <a:r>
-              <a:rPr lang="en-US" dirty="0" err="1"/>
+              <a:rPr lang="en-US" dirty="0" err="1">
+                <a:solidFill>
+                  <a:srgbClr val="FF0000"/>
+                </a:solidFill>
+              </a:rPr>
               <a:t>fs.FSWatcher</a:t>
             </a:r>
-            <a:endParaRPr lang="en-US" dirty="0"/>
+            <a:endParaRPr lang="en-US" dirty="0">
+              <a:solidFill>
+                <a:srgbClr val="FF0000"/>
+              </a:solidFill>
+            </a:endParaRPr>
           </a:p>
           <a:p>
             <a:r>
@@ -6762,14 +6780,25 @@
             <a:pPr lvl="1"/>
             <a:r>
               <a:rPr lang="en-US" sz="2000" dirty="0" smtClean="0">
+                <a:solidFill>
+                  <a:srgbClr val="FF0000"/>
+                </a:solidFill>
                 <a:latin typeface="Monaco"/>
                 <a:cs typeface="Monaco"/>
               </a:rPr>
               <a:t>event</a:t>
             </a:r>
             <a:r>
+              <a:rPr lang="en-US" dirty="0" smtClean="0">
+                <a:solidFill>
+                  <a:srgbClr val="FF0000"/>
+                </a:solidFill>
+              </a:rPr>
+              <a:t> </a:t>
+            </a:r>
+            <a:r>
               <a:rPr lang="en-US" dirty="0" smtClean="0"/>
-              <a:t> is a string that is either </a:t>
+              <a:t>is a string that is either </a:t>
             </a:r>
             <a:r>
               <a:rPr lang="en-US" sz="2000" dirty="0" smtClean="0">
@@ -6809,14 +6838,25 @@
             <a:pPr lvl="1"/>
             <a:r>
               <a:rPr lang="en-US" sz="2000" dirty="0" smtClean="0">
+                <a:solidFill>
+                  <a:srgbClr val="FF0000"/>
+                </a:solidFill>
                 <a:latin typeface="Monaco"/>
                 <a:cs typeface="Monaco"/>
               </a:rPr>
               <a:t>filename</a:t>
             </a:r>
             <a:r>
+              <a:rPr lang="en-US" dirty="0" smtClean="0">
+                <a:solidFill>
+                  <a:srgbClr val="FF0000"/>
+                </a:solidFill>
+              </a:rPr>
+              <a:t> </a:t>
+            </a:r>
+            <a:r>
               <a:rPr lang="en-US" dirty="0" smtClean="0"/>
-              <a:t> is not always present on all platforms, so avoid depending on it.</a:t>
+              <a:t>is not always present on all platforms, so avoid depending on it.</a:t>
             </a:r>
           </a:p>
         </p:txBody>
@@ -9002,11 +9042,7 @@
           <a:p>
             <a:r>
               <a:rPr lang="en-US" dirty="0" smtClean="0"/>
-              <a:t>Reading &amp; Writing Files: </a:t>
-            </a:r>
-            <a:r>
-              <a:rPr lang="en-US" dirty="0" smtClean="0"/>
-              <a:t>Overview</a:t>
+              <a:t>Reading &amp; Writing Files: Overview</a:t>
             </a:r>
             <a:endParaRPr lang="en-US" dirty="0"/>
           </a:p>
@@ -9106,6 +9142,9 @@
           <a:p>
             <a:r>
               <a:rPr lang="en-US" sz="2000" dirty="0" err="1" smtClean="0">
+                <a:solidFill>
+                  <a:srgbClr val="FF0000"/>
+                </a:solidFill>
                 <a:latin typeface="Monaco"/>
                 <a:cs typeface="Monaco"/>
               </a:rPr>
@@ -9123,6 +9162,9 @@
             <a:pPr lvl="1"/>
             <a:r>
               <a:rPr lang="en-US" sz="1600" dirty="0">
+                <a:solidFill>
+                  <a:srgbClr val="FF0000"/>
+                </a:solidFill>
                 <a:latin typeface="Monaco"/>
                 <a:cs typeface="Monaco"/>
               </a:rPr>
@@ -9130,11 +9172,7 @@
             </a:r>
             <a:r>
               <a:rPr lang="en-US" dirty="0" smtClean="0"/>
-              <a:t>: </a:t>
-            </a:r>
-            <a:r>
-              <a:rPr lang="en-US" dirty="0" smtClean="0"/>
-              <a:t>purpose plus optional modifier(s)</a:t>
+              <a:t>: purpose plus optional modifier(s)</a:t>
             </a:r>
           </a:p>
           <a:p>
@@ -9166,15 +9204,7 @@
             </a:r>
             <a:r>
               <a:rPr lang="en-US" dirty="0" smtClean="0"/>
-              <a:t>: </a:t>
-            </a:r>
-            <a:r>
-              <a:rPr lang="en-US" dirty="0" smtClean="0"/>
-              <a:t>optional </a:t>
-            </a:r>
-            <a:r>
-              <a:rPr lang="en-US" dirty="0" smtClean="0"/>
-              <a:t>file mode (permissions &amp; sticky bits)</a:t>
+              <a:t>: optional file mode (permissions &amp; sticky bits)</a:t>
             </a:r>
           </a:p>
           <a:p>
@@ -9195,6 +9225,9 @@
             <a:pPr lvl="1"/>
             <a:r>
               <a:rPr lang="en-US" sz="1600" dirty="0">
+                <a:solidFill>
+                  <a:srgbClr val="FF0000"/>
+                </a:solidFill>
                 <a:latin typeface="Monaco"/>
                 <a:cs typeface="Monaco"/>
               </a:rPr>
@@ -9280,11 +9313,7 @@
           <a:p>
             <a:r>
               <a:rPr lang="en-US" dirty="0" smtClean="0"/>
-              <a:t>Reading &amp; Writing Files: </a:t>
-            </a:r>
-            <a:r>
-              <a:rPr lang="en-US" dirty="0" smtClean="0"/>
-              <a:t>Opening</a:t>
+              <a:t>Reading &amp; Writing Files: Opening</a:t>
             </a:r>
             <a:endParaRPr lang="en-US" dirty="0"/>
           </a:p>
@@ -9384,11 +9413,7 @@
           <a:p>
             <a:r>
               <a:rPr lang="en-US" dirty="0" smtClean="0"/>
-              <a:t>Reading a File: </a:t>
-            </a:r>
-            <a:r>
-              <a:rPr lang="en-US" dirty="0" smtClean="0"/>
-              <a:t>Example</a:t>
+              <a:t>Reading a File: Example</a:t>
             </a:r>
             <a:endParaRPr lang="en-US" dirty="0"/>
           </a:p>

</xml_diff>